<commit_message>
Slide de apresentação - Final
</commit_message>
<xml_diff>
--- a/ENR/ENR_ApresentaçãoControla.pptx
+++ b/ENR/ENR_ApresentaçãoControla.pptx
@@ -5,7 +5,7 @@
     <p:sldMasterId id="2147483648" r:id="rId1"/>
   </p:sldMasterIdLst>
   <p:notesMasterIdLst>
-    <p:notesMasterId r:id="rId7"/>
+    <p:notesMasterId r:id="rId8"/>
   </p:notesMasterIdLst>
   <p:sldIdLst>
     <p:sldId id="257" r:id="rId2"/>
@@ -13,6 +13,7 @@
     <p:sldId id="259" r:id="rId4"/>
     <p:sldId id="260" r:id="rId5"/>
     <p:sldId id="261" r:id="rId6"/>
+    <p:sldId id="262" r:id="rId7"/>
   </p:sldIdLst>
   <p:sldSz cx="9144000" cy="6858000" type="screen4x3"/>
   <p:notesSz cx="6858000" cy="9144000"/>
@@ -196,7 +197,7 @@
           <a:p>
             <a:fld id="{7A3C28EE-6C40-45CE-9FE8-AE48601ECFEF}" type="datetimeFigureOut">
               <a:rPr lang="pt-BR" smtClean="0"/>
-              <a:t>10/04/2013</a:t>
+              <a:t>11/04/2013</a:t>
             </a:fld>
             <a:endParaRPr lang="pt-BR"/>
           </a:p>
@@ -813,7 +814,7 @@
           <a:p>
             <a:fld id="{F9C6BB3A-57B2-43FD-A09F-53003DC2AC93}" type="datetime2">
               <a:rPr lang="pt-BR" smtClean="0"/>
-              <a:t>quarta-feira, 10 de abril de 2013</a:t>
+              <a:t>quinta-feira, 11 de abril de 2013</a:t>
             </a:fld>
             <a:endParaRPr lang="pt-BR"/>
           </a:p>
@@ -987,7 +988,7 @@
           <a:p>
             <a:fld id="{94ACA8AA-59D7-4A12-A70F-72AEC8A79B28}" type="datetime2">
               <a:rPr lang="pt-BR" smtClean="0"/>
-              <a:t>quarta-feira, 10 de abril de 2013</a:t>
+              <a:t>quinta-feira, 11 de abril de 2013</a:t>
             </a:fld>
             <a:endParaRPr lang="pt-BR"/>
           </a:p>
@@ -1171,7 +1172,7 @@
           <a:p>
             <a:fld id="{08842903-423A-4CCA-9FAF-E7F45BFB08E6}" type="datetime2">
               <a:rPr lang="pt-BR" smtClean="0"/>
-              <a:t>quarta-feira, 10 de abril de 2013</a:t>
+              <a:t>quinta-feira, 11 de abril de 2013</a:t>
             </a:fld>
             <a:endParaRPr lang="pt-BR"/>
           </a:p>
@@ -1345,7 +1346,7 @@
           <a:p>
             <a:fld id="{BE36F104-D94A-49A8-838B-993B898F0947}" type="datetime2">
               <a:rPr lang="pt-BR" smtClean="0"/>
-              <a:t>quarta-feira, 10 de abril de 2013</a:t>
+              <a:t>quinta-feira, 11 de abril de 2013</a:t>
             </a:fld>
             <a:endParaRPr lang="pt-BR"/>
           </a:p>
@@ -1649,7 +1650,7 @@
           <a:p>
             <a:fld id="{DD0BD73F-F85F-44A6-A3BE-70CF95748E48}" type="datetime2">
               <a:rPr lang="pt-BR" smtClean="0"/>
-              <a:t>quarta-feira, 10 de abril de 2013</a:t>
+              <a:t>quinta-feira, 11 de abril de 2013</a:t>
             </a:fld>
             <a:endParaRPr lang="pt-BR"/>
           </a:p>
@@ -1941,7 +1942,7 @@
           <a:p>
             <a:fld id="{4C3A5499-BCF8-4122-9F41-9B9996F435AB}" type="datetime2">
               <a:rPr lang="pt-BR" smtClean="0"/>
-              <a:t>quarta-feira, 10 de abril de 2013</a:t>
+              <a:t>quinta-feira, 11 de abril de 2013</a:t>
             </a:fld>
             <a:endParaRPr lang="pt-BR"/>
           </a:p>
@@ -2367,7 +2368,7 @@
           <a:p>
             <a:fld id="{59C06758-D1B1-4DDD-87E7-445109776095}" type="datetime2">
               <a:rPr lang="pt-BR" smtClean="0"/>
-              <a:t>quarta-feira, 10 de abril de 2013</a:t>
+              <a:t>quinta-feira, 11 de abril de 2013</a:t>
             </a:fld>
             <a:endParaRPr lang="pt-BR"/>
           </a:p>
@@ -2489,7 +2490,7 @@
           <a:p>
             <a:fld id="{EB53165E-247C-455D-B2FD-F8FB36B64151}" type="datetime2">
               <a:rPr lang="pt-BR" smtClean="0"/>
-              <a:t>quarta-feira, 10 de abril de 2013</a:t>
+              <a:t>quinta-feira, 11 de abril de 2013</a:t>
             </a:fld>
             <a:endParaRPr lang="pt-BR"/>
           </a:p>
@@ -2588,7 +2589,7 @@
           <a:p>
             <a:fld id="{6F34C47F-E116-490D-AF1F-EC8929E5142C}" type="datetime2">
               <a:rPr lang="pt-BR" smtClean="0"/>
-              <a:t>quarta-feira, 10 de abril de 2013</a:t>
+              <a:t>quinta-feira, 11 de abril de 2013</a:t>
             </a:fld>
             <a:endParaRPr lang="pt-BR"/>
           </a:p>
@@ -2869,7 +2870,7 @@
           <a:p>
             <a:fld id="{B1F6CCA8-02CE-438C-A883-F7C15B002FFA}" type="datetime2">
               <a:rPr lang="pt-BR" smtClean="0"/>
-              <a:t>quarta-feira, 10 de abril de 2013</a:t>
+              <a:t>quinta-feira, 11 de abril de 2013</a:t>
             </a:fld>
             <a:endParaRPr lang="pt-BR"/>
           </a:p>
@@ -3126,7 +3127,7 @@
           <a:p>
             <a:fld id="{E5171BFD-B9A7-4DEB-8729-15BD141304DA}" type="datetime2">
               <a:rPr lang="pt-BR" smtClean="0"/>
-              <a:t>quarta-feira, 10 de abril de 2013</a:t>
+              <a:t>quinta-feira, 11 de abril de 2013</a:t>
             </a:fld>
             <a:endParaRPr lang="pt-BR"/>
           </a:p>
@@ -3366,7 +3367,7 @@
           <a:p>
             <a:fld id="{67497947-6B50-4480-B084-C2D31639B398}" type="datetime2">
               <a:rPr lang="pt-BR" smtClean="0"/>
-              <a:t>quarta-feira, 10 de abril de 2013</a:t>
+              <a:t>quinta-feira, 11 de abril de 2013</a:t>
             </a:fld>
             <a:endParaRPr lang="pt-BR"/>
           </a:p>
@@ -3768,7 +3769,7 @@
           <a:p>
             <a:fld id="{AFAF114F-AA60-4C76-8EEE-FC1ABCD89A4B}" type="datetime2">
               <a:rPr lang="pt-BR" smtClean="0"/>
-              <a:t>quarta-feira, 10 de abril de 2013</a:t>
+              <a:t>quinta-feira, 11 de abril de 2013</a:t>
             </a:fld>
             <a:endParaRPr lang="pt-BR" dirty="0"/>
           </a:p>
@@ -4090,7 +4091,7 @@
           <a:p>
             <a:fld id="{728D93DD-314F-4DBD-82E5-D5272A27DD00}" type="datetime2">
               <a:rPr lang="pt-BR" smtClean="0"/>
-              <a:t>quarta-feira, 10 de abril de 2013</a:t>
+              <a:t>quinta-feira, 11 de abril de 2013</a:t>
             </a:fld>
             <a:endParaRPr lang="pt-BR" dirty="0"/>
           </a:p>
@@ -4437,7 +4438,7 @@
           <a:p>
             <a:fld id="{377EEF09-A215-46A8-B054-AF1D5107DBD9}" type="datetime2">
               <a:rPr lang="pt-BR" smtClean="0"/>
-              <a:t>quarta-feira, 10 de abril de 2013</a:t>
+              <a:t>quinta-feira, 11 de abril de 2013</a:t>
             </a:fld>
             <a:endParaRPr lang="pt-BR" dirty="0"/>
           </a:p>
@@ -4684,11 +4685,7 @@
             </a:r>
             <a:r>
               <a:rPr lang="pt-BR" dirty="0" smtClean="0"/>
-              <a:t>Erros</a:t>
-            </a:r>
-            <a:r>
-              <a:rPr lang="pt-BR" dirty="0" smtClean="0"/>
-              <a:t>.</a:t>
+              <a:t>Erros.</a:t>
             </a:r>
           </a:p>
           <a:p>
@@ -4700,7 +4697,6 @@
               <a:rPr lang="pt-BR" dirty="0"/>
               <a:t>de Especificação de Requisitos;</a:t>
             </a:r>
-            <a:endParaRPr lang="pt-BR" dirty="0"/>
           </a:p>
         </p:txBody>
       </p:sp>
@@ -4795,7 +4791,7 @@
           <a:p>
             <a:fld id="{9581F365-8DAB-420F-A7DB-216BAC3AA32B}" type="datetime2">
               <a:rPr lang="pt-BR" smtClean="0"/>
-              <a:t>quarta-feira, 10 de abril de 2013</a:t>
+              <a:t>quinta-feira, 11 de abril de 2013</a:t>
             </a:fld>
             <a:endParaRPr lang="pt-BR" dirty="0"/>
           </a:p>
@@ -5074,7 +5070,7 @@
           <a:p>
             <a:fld id="{D386E331-3C1E-41EC-AFE8-3B1B14085B77}" type="datetime2">
               <a:rPr lang="pt-BR" smtClean="0"/>
-              <a:t>quarta-feira, 10 de abril de 2013</a:t>
+              <a:t>quinta-feira, 11 de abril de 2013</a:t>
             </a:fld>
             <a:endParaRPr lang="pt-BR" dirty="0"/>
           </a:p>
@@ -5244,6 +5240,333 @@
     <p:extLst>
       <p:ext uri="{BB962C8B-B14F-4D97-AF65-F5344CB8AC3E}">
         <p14:creationId xmlns:p14="http://schemas.microsoft.com/office/powerpoint/2010/main" val="1940363024"/>
+      </p:ext>
+    </p:extLst>
+  </p:cSld>
+  <p:clrMapOvr>
+    <a:masterClrMapping/>
+  </p:clrMapOvr>
+  <p:timing>
+    <p:tnLst>
+      <p:par>
+        <p:cTn id="1" dur="indefinite" restart="never" nodeType="tmRoot"/>
+      </p:par>
+    </p:tnLst>
+  </p:timing>
+</p:sld>
+</file>
+
+<file path=ppt/slides/slide6.xml><?xml version="1.0" encoding="utf-8"?>
+<p:sld xmlns:a="http://schemas.openxmlformats.org/drawingml/2006/main" xmlns:r="http://schemas.openxmlformats.org/officeDocument/2006/relationships" xmlns:p="http://schemas.openxmlformats.org/presentationml/2006/main">
+  <p:cSld>
+    <p:spTree>
+      <p:nvGrpSpPr>
+        <p:cNvPr id="1" name=""/>
+        <p:cNvGrpSpPr/>
+        <p:nvPr/>
+      </p:nvGrpSpPr>
+      <p:grpSpPr>
+        <a:xfrm>
+          <a:off x="0" y="0"/>
+          <a:ext cx="0" cy="0"/>
+          <a:chOff x="0" y="0"/>
+          <a:chExt cx="0" cy="0"/>
+        </a:xfrm>
+      </p:grpSpPr>
+      <p:sp>
+        <p:nvSpPr>
+          <p:cNvPr id="2" name="Título 1"/>
+          <p:cNvSpPr>
+            <a:spLocks noGrp="1"/>
+          </p:cNvSpPr>
+          <p:nvPr>
+            <p:ph type="title"/>
+          </p:nvPr>
+        </p:nvSpPr>
+        <p:spPr>
+          <a:xfrm>
+            <a:off x="467544" y="260648"/>
+            <a:ext cx="8229600" cy="994122"/>
+          </a:xfrm>
+        </p:spPr>
+        <p:txBody>
+          <a:bodyPr/>
+          <a:lstStyle/>
+          <a:p>
+            <a:r>
+              <a:rPr lang="pt-BR" dirty="0" smtClean="0">
+                <a:latin typeface="Arial Black" pitchFamily="34" charset="0"/>
+              </a:rPr>
+              <a:t>Bibliografia</a:t>
+            </a:r>
+            <a:endParaRPr lang="en-US" dirty="0"/>
+          </a:p>
+        </p:txBody>
+      </p:sp>
+      <p:sp>
+        <p:nvSpPr>
+          <p:cNvPr id="4" name="Espaço Reservado para Data 3"/>
+          <p:cNvSpPr>
+            <a:spLocks noGrp="1"/>
+          </p:cNvSpPr>
+          <p:nvPr>
+            <p:ph type="dt" sz="half" idx="10"/>
+          </p:nvPr>
+        </p:nvSpPr>
+        <p:spPr>
+          <a:xfrm>
+            <a:off x="457200" y="6356350"/>
+            <a:ext cx="2242592" cy="365125"/>
+          </a:xfrm>
+        </p:spPr>
+        <p:txBody>
+          <a:bodyPr/>
+          <a:lstStyle/>
+          <a:p>
+            <a:fld id="{BE36F104-D94A-49A8-838B-993B898F0947}" type="datetime2">
+              <a:rPr lang="pt-BR" smtClean="0"/>
+              <a:t>quinta-feira, 11 de abril de 2013</a:t>
+            </a:fld>
+            <a:endParaRPr lang="pt-BR" dirty="0"/>
+          </a:p>
+        </p:txBody>
+      </p:sp>
+      <p:sp>
+        <p:nvSpPr>
+          <p:cNvPr id="5" name="Espaço Reservado para Rodapé 4"/>
+          <p:cNvSpPr>
+            <a:spLocks noGrp="1"/>
+          </p:cNvSpPr>
+          <p:nvPr>
+            <p:ph type="ftr" sz="quarter" idx="11"/>
+          </p:nvPr>
+        </p:nvSpPr>
+        <p:spPr/>
+        <p:txBody>
+          <a:bodyPr/>
+          <a:lstStyle/>
+          <a:p>
+            <a:r>
+              <a:rPr lang="pt-BR" smtClean="0"/>
+              <a:t>Análise e Desenvolvimento de Sistemas</a:t>
+            </a:r>
+            <a:endParaRPr lang="pt-BR"/>
+          </a:p>
+        </p:txBody>
+      </p:sp>
+      <p:sp>
+        <p:nvSpPr>
+          <p:cNvPr id="6" name="Espaço Reservado para Número de Slide 5"/>
+          <p:cNvSpPr>
+            <a:spLocks noGrp="1"/>
+          </p:cNvSpPr>
+          <p:nvPr>
+            <p:ph type="sldNum" sz="quarter" idx="12"/>
+          </p:nvPr>
+        </p:nvSpPr>
+        <p:spPr/>
+        <p:txBody>
+          <a:bodyPr/>
+          <a:lstStyle/>
+          <a:p>
+            <a:fld id="{39102EDB-8E19-4D28-A546-36C1528C4E74}" type="slidenum">
+              <a:rPr lang="pt-BR" smtClean="0"/>
+              <a:t>6</a:t>
+            </a:fld>
+            <a:endParaRPr lang="pt-BR"/>
+          </a:p>
+        </p:txBody>
+      </p:sp>
+      <p:sp>
+        <p:nvSpPr>
+          <p:cNvPr id="7" name="CaixaDeTexto 6"/>
+          <p:cNvSpPr txBox="1"/>
+          <p:nvPr/>
+        </p:nvSpPr>
+        <p:spPr>
+          <a:xfrm>
+            <a:off x="1259632" y="1484784"/>
+            <a:ext cx="6624736" cy="369332"/>
+          </a:xfrm>
+          <a:prstGeom prst="rect">
+            <a:avLst/>
+          </a:prstGeom>
+          <a:noFill/>
+        </p:spPr>
+        <p:txBody>
+          <a:bodyPr wrap="square" rtlCol="0">
+            <a:spAutoFit/>
+          </a:bodyPr>
+          <a:lstStyle/>
+          <a:p>
+            <a:r>
+              <a:rPr lang="en-US" dirty="0">
+                <a:hlinkClick r:id="rId2"/>
+              </a:rPr>
+              <a:t>http://</a:t>
+            </a:r>
+            <a:r>
+              <a:rPr lang="en-US" dirty="0" smtClean="0">
+                <a:hlinkClick r:id="rId2"/>
+              </a:rPr>
+              <a:t>www.devmedia.com.br/controla/283#ixzz2NFECr0gO</a:t>
+            </a:r>
+            <a:endParaRPr lang="en-US" dirty="0" smtClean="0"/>
+          </a:p>
+        </p:txBody>
+      </p:sp>
+      <p:sp>
+        <p:nvSpPr>
+          <p:cNvPr id="8" name="CaixaDeTexto 7"/>
+          <p:cNvSpPr txBox="1"/>
+          <p:nvPr/>
+        </p:nvSpPr>
+        <p:spPr>
+          <a:xfrm>
+            <a:off x="1331640" y="3862789"/>
+            <a:ext cx="6480720" cy="646331"/>
+          </a:xfrm>
+          <a:prstGeom prst="rect">
+            <a:avLst/>
+          </a:prstGeom>
+          <a:noFill/>
+        </p:spPr>
+        <p:txBody>
+          <a:bodyPr wrap="square" rtlCol="0">
+            <a:spAutoFit/>
+          </a:bodyPr>
+          <a:lstStyle/>
+          <a:p>
+            <a:r>
+              <a:rPr lang="pt-BR" dirty="0"/>
+              <a:t>Link para download da ferramenta </a:t>
+            </a:r>
+            <a:r>
+              <a:rPr lang="pt-BR" dirty="0" smtClean="0"/>
+              <a:t>Controla e desta apresentação</a:t>
+            </a:r>
+            <a:endParaRPr lang="en-US" dirty="0">
+              <a:hlinkClick r:id="rId3"/>
+            </a:endParaRPr>
+          </a:p>
+          <a:p>
+            <a:r>
+              <a:rPr lang="en-US" dirty="0" smtClean="0">
+                <a:hlinkClick r:id="rId3"/>
+              </a:rPr>
+              <a:t>http</a:t>
+            </a:r>
+            <a:r>
+              <a:rPr lang="en-US" dirty="0">
+                <a:hlinkClick r:id="rId3"/>
+              </a:rPr>
+              <a:t>://</a:t>
+            </a:r>
+            <a:r>
+              <a:rPr lang="en-US" dirty="0" smtClean="0">
+                <a:hlinkClick r:id="rId3"/>
+              </a:rPr>
+              <a:t>www.mediafire.com/alcidelio</a:t>
+            </a:r>
+            <a:endParaRPr lang="en-US" dirty="0"/>
+          </a:p>
+        </p:txBody>
+      </p:sp>
+      <p:sp>
+        <p:nvSpPr>
+          <p:cNvPr id="9" name="CaixaDeTexto 8"/>
+          <p:cNvSpPr txBox="1"/>
+          <p:nvPr/>
+        </p:nvSpPr>
+        <p:spPr>
+          <a:xfrm>
+            <a:off x="2123728" y="4725144"/>
+            <a:ext cx="4968552" cy="1200329"/>
+          </a:xfrm>
+          <a:prstGeom prst="rect">
+            <a:avLst/>
+          </a:prstGeom>
+          <a:noFill/>
+        </p:spPr>
+        <p:txBody>
+          <a:bodyPr wrap="square" rtlCol="0">
+            <a:spAutoFit/>
+          </a:bodyPr>
+          <a:lstStyle/>
+          <a:p>
+            <a:r>
+              <a:rPr lang="en-US" sz="7200" dirty="0" smtClean="0">
+                <a:solidFill>
+                  <a:schemeClr val="tx2">
+                    <a:lumMod val="75000"/>
+                  </a:schemeClr>
+                </a:solidFill>
+                <a:latin typeface="Algerian" pitchFamily="82" charset="0"/>
+                <a:cs typeface="Arial" pitchFamily="34" charset="0"/>
+              </a:rPr>
+              <a:t>OBRIGADO</a:t>
+            </a:r>
+            <a:endParaRPr lang="en-US" sz="7200" dirty="0">
+              <a:solidFill>
+                <a:schemeClr val="tx2">
+                  <a:lumMod val="75000"/>
+                </a:schemeClr>
+              </a:solidFill>
+              <a:latin typeface="Algerian" pitchFamily="82" charset="0"/>
+              <a:cs typeface="Arial" pitchFamily="34" charset="0"/>
+            </a:endParaRPr>
+          </a:p>
+        </p:txBody>
+      </p:sp>
+      <p:sp>
+        <p:nvSpPr>
+          <p:cNvPr id="10" name="CaixaDeTexto 9"/>
+          <p:cNvSpPr txBox="1"/>
+          <p:nvPr/>
+        </p:nvSpPr>
+        <p:spPr>
+          <a:xfrm>
+            <a:off x="1259632" y="2566645"/>
+            <a:ext cx="6408712" cy="646331"/>
+          </a:xfrm>
+          <a:prstGeom prst="rect">
+            <a:avLst/>
+          </a:prstGeom>
+          <a:noFill/>
+        </p:spPr>
+        <p:txBody>
+          <a:bodyPr wrap="square" rtlCol="0">
+            <a:spAutoFit/>
+          </a:bodyPr>
+          <a:lstStyle/>
+          <a:p>
+            <a:r>
+              <a:rPr lang="pt-BR" dirty="0"/>
+              <a:t>Link para download da ferramenta Controla</a:t>
+            </a:r>
+            <a:br>
+              <a:rPr lang="pt-BR" dirty="0"/>
+            </a:br>
+            <a:r>
+              <a:rPr lang="pt-BR" u="sng" dirty="0">
+                <a:hlinkClick r:id="rId4"/>
+              </a:rPr>
+              <a:t>http://</a:t>
+            </a:r>
+            <a:r>
+              <a:rPr lang="pt-BR" u="sng" dirty="0" smtClean="0">
+                <a:hlinkClick r:id="rId4"/>
+              </a:rPr>
+              <a:t>www.linkados.com.br</a:t>
+            </a:r>
+            <a:endParaRPr lang="en-US" dirty="0"/>
+          </a:p>
+        </p:txBody>
+      </p:sp>
+    </p:spTree>
+    <p:extLst>
+      <p:ext uri="{BB962C8B-B14F-4D97-AF65-F5344CB8AC3E}">
+        <p14:creationId xmlns:p14="http://schemas.microsoft.com/office/powerpoint/2010/main" val="2800470389"/>
       </p:ext>
     </p:extLst>
   </p:cSld>

</xml_diff>

<commit_message>
Apresentação controla slide final - atualização
</commit_message>
<xml_diff>
--- a/ENR/ENR_ApresentaçãoControla.pptx
+++ b/ENR/ENR_ApresentaçãoControla.pptx
@@ -5,7 +5,7 @@
     <p:sldMasterId id="2147483648" r:id="rId1"/>
   </p:sldMasterIdLst>
   <p:notesMasterIdLst>
-    <p:notesMasterId r:id="rId8"/>
+    <p:notesMasterId r:id="rId9"/>
   </p:notesMasterIdLst>
   <p:sldIdLst>
     <p:sldId id="257" r:id="rId2"/>
@@ -14,6 +14,7 @@
     <p:sldId id="260" r:id="rId5"/>
     <p:sldId id="261" r:id="rId6"/>
     <p:sldId id="262" r:id="rId7"/>
+    <p:sldId id="263" r:id="rId8"/>
   </p:sldIdLst>
   <p:sldSz cx="9144000" cy="6858000" type="screen4x3"/>
   <p:notesSz cx="6858000" cy="9144000"/>
@@ -5423,7 +5424,7 @@
         </p:nvSpPr>
         <p:spPr>
           <a:xfrm>
-            <a:off x="1331640" y="3862789"/>
+            <a:off x="1331640" y="4582869"/>
             <a:ext cx="6480720" cy="646331"/>
           </a:xfrm>
           <a:prstGeom prst="rect">
@@ -5474,14 +5475,14 @@
       </p:sp>
       <p:sp>
         <p:nvSpPr>
-          <p:cNvPr id="9" name="CaixaDeTexto 8"/>
+          <p:cNvPr id="10" name="CaixaDeTexto 9"/>
           <p:cNvSpPr txBox="1"/>
           <p:nvPr/>
         </p:nvSpPr>
         <p:spPr>
           <a:xfrm>
-            <a:off x="2123728" y="4725144"/>
-            <a:ext cx="4968552" cy="1200329"/>
+            <a:off x="1259632" y="2924944"/>
+            <a:ext cx="6408712" cy="646331"/>
           </a:xfrm>
           <a:prstGeom prst="rect">
             <a:avLst/>
@@ -5495,7 +5496,163 @@
           <a:lstStyle/>
           <a:p>
             <a:r>
-              <a:rPr lang="en-US" sz="7200" dirty="0" smtClean="0">
+              <a:rPr lang="pt-BR" dirty="0"/>
+              <a:t>Link para download da ferramenta Controla</a:t>
+            </a:r>
+            <a:br>
+              <a:rPr lang="pt-BR" dirty="0"/>
+            </a:br>
+            <a:r>
+              <a:rPr lang="pt-BR" u="sng" dirty="0">
+                <a:hlinkClick r:id="rId4"/>
+              </a:rPr>
+              <a:t>http://</a:t>
+            </a:r>
+            <a:r>
+              <a:rPr lang="pt-BR" u="sng" dirty="0" smtClean="0">
+                <a:hlinkClick r:id="rId4"/>
+              </a:rPr>
+              <a:t>www.linkados.com.br</a:t>
+            </a:r>
+            <a:endParaRPr lang="en-US" dirty="0"/>
+          </a:p>
+        </p:txBody>
+      </p:sp>
+    </p:spTree>
+    <p:extLst>
+      <p:ext uri="{BB962C8B-B14F-4D97-AF65-F5344CB8AC3E}">
+        <p14:creationId xmlns:p14="http://schemas.microsoft.com/office/powerpoint/2010/main" val="2800470389"/>
+      </p:ext>
+    </p:extLst>
+  </p:cSld>
+  <p:clrMapOvr>
+    <a:masterClrMapping/>
+  </p:clrMapOvr>
+  <p:timing>
+    <p:tnLst>
+      <p:par>
+        <p:cTn id="1" dur="indefinite" restart="never" nodeType="tmRoot"/>
+      </p:par>
+    </p:tnLst>
+  </p:timing>
+</p:sld>
+</file>
+
+<file path=ppt/slides/slide7.xml><?xml version="1.0" encoding="utf-8"?>
+<p:sld xmlns:a="http://schemas.openxmlformats.org/drawingml/2006/main" xmlns:r="http://schemas.openxmlformats.org/officeDocument/2006/relationships" xmlns:p="http://schemas.openxmlformats.org/presentationml/2006/main">
+  <p:cSld>
+    <p:spTree>
+      <p:nvGrpSpPr>
+        <p:cNvPr id="1" name=""/>
+        <p:cNvGrpSpPr/>
+        <p:nvPr/>
+      </p:nvGrpSpPr>
+      <p:grpSpPr>
+        <a:xfrm>
+          <a:off x="0" y="0"/>
+          <a:ext cx="0" cy="0"/>
+          <a:chOff x="0" y="0"/>
+          <a:chExt cx="0" cy="0"/>
+        </a:xfrm>
+      </p:grpSpPr>
+      <p:sp>
+        <p:nvSpPr>
+          <p:cNvPr id="4" name="Espaço Reservado para Data 3"/>
+          <p:cNvSpPr>
+            <a:spLocks noGrp="1"/>
+          </p:cNvSpPr>
+          <p:nvPr>
+            <p:ph type="dt" sz="half" idx="10"/>
+          </p:nvPr>
+        </p:nvSpPr>
+        <p:spPr>
+          <a:xfrm>
+            <a:off x="457200" y="6356350"/>
+            <a:ext cx="2386608" cy="365125"/>
+          </a:xfrm>
+        </p:spPr>
+        <p:txBody>
+          <a:bodyPr/>
+          <a:lstStyle/>
+          <a:p>
+            <a:fld id="{BE36F104-D94A-49A8-838B-993B898F0947}" type="datetime2">
+              <a:rPr lang="pt-BR" smtClean="0"/>
+              <a:t>quinta-feira, 11 de abril de 2013</a:t>
+            </a:fld>
+            <a:endParaRPr lang="pt-BR" dirty="0"/>
+          </a:p>
+        </p:txBody>
+      </p:sp>
+      <p:sp>
+        <p:nvSpPr>
+          <p:cNvPr id="5" name="Espaço Reservado para Rodapé 4"/>
+          <p:cNvSpPr>
+            <a:spLocks noGrp="1"/>
+          </p:cNvSpPr>
+          <p:nvPr>
+            <p:ph type="ftr" sz="quarter" idx="11"/>
+          </p:nvPr>
+        </p:nvSpPr>
+        <p:spPr/>
+        <p:txBody>
+          <a:bodyPr/>
+          <a:lstStyle/>
+          <a:p>
+            <a:r>
+              <a:rPr lang="pt-BR" smtClean="0"/>
+              <a:t>Análise e Desenvolvimento de Sistemas</a:t>
+            </a:r>
+            <a:endParaRPr lang="pt-BR"/>
+          </a:p>
+        </p:txBody>
+      </p:sp>
+      <p:sp>
+        <p:nvSpPr>
+          <p:cNvPr id="6" name="Espaço Reservado para Número de Slide 5"/>
+          <p:cNvSpPr>
+            <a:spLocks noGrp="1"/>
+          </p:cNvSpPr>
+          <p:nvPr>
+            <p:ph type="sldNum" sz="quarter" idx="12"/>
+          </p:nvPr>
+        </p:nvSpPr>
+        <p:spPr/>
+        <p:txBody>
+          <a:bodyPr/>
+          <a:lstStyle/>
+          <a:p>
+            <a:fld id="{39102EDB-8E19-4D28-A546-36C1528C4E74}" type="slidenum">
+              <a:rPr lang="pt-BR" smtClean="0"/>
+              <a:t>7</a:t>
+            </a:fld>
+            <a:endParaRPr lang="pt-BR"/>
+          </a:p>
+        </p:txBody>
+      </p:sp>
+      <p:sp>
+        <p:nvSpPr>
+          <p:cNvPr id="7" name="CaixaDeTexto 6"/>
+          <p:cNvSpPr txBox="1"/>
+          <p:nvPr/>
+        </p:nvSpPr>
+        <p:spPr>
+          <a:xfrm>
+            <a:off x="1547664" y="2470244"/>
+            <a:ext cx="6408712" cy="3046988"/>
+          </a:xfrm>
+          <a:prstGeom prst="rect">
+            <a:avLst/>
+          </a:prstGeom>
+          <a:noFill/>
+        </p:spPr>
+        <p:txBody>
+          <a:bodyPr wrap="square" rtlCol="0">
+            <a:spAutoFit/>
+          </a:bodyPr>
+          <a:lstStyle/>
+          <a:p>
+            <a:r>
+              <a:rPr lang="en-US" sz="9600" dirty="0">
                 <a:solidFill>
                   <a:schemeClr val="tx2">
                     <a:lumMod val="75000"/>
@@ -5506,67 +5663,25 @@
               </a:rPr>
               <a:t>OBRIGADO</a:t>
             </a:r>
-            <a:endParaRPr lang="en-US" sz="7200" dirty="0">
-              <a:solidFill>
-                <a:schemeClr val="tx2">
-                  <a:lumMod val="75000"/>
-                </a:schemeClr>
-              </a:solidFill>
-              <a:latin typeface="Algerian" pitchFamily="82" charset="0"/>
-              <a:cs typeface="Arial" pitchFamily="34" charset="0"/>
-            </a:endParaRPr>
-          </a:p>
-        </p:txBody>
-      </p:sp>
-      <p:sp>
-        <p:nvSpPr>
-          <p:cNvPr id="10" name="CaixaDeTexto 9"/>
-          <p:cNvSpPr txBox="1"/>
-          <p:nvPr/>
-        </p:nvSpPr>
-        <p:spPr>
-          <a:xfrm>
-            <a:off x="1259632" y="2566645"/>
-            <a:ext cx="6408712" cy="646331"/>
-          </a:xfrm>
-          <a:prstGeom prst="rect">
-            <a:avLst/>
-          </a:prstGeom>
-          <a:noFill/>
-        </p:spPr>
-        <p:txBody>
-          <a:bodyPr wrap="square" rtlCol="0">
-            <a:spAutoFit/>
-          </a:bodyPr>
-          <a:lstStyle/>
-          <a:p>
-            <a:r>
-              <a:rPr lang="pt-BR" dirty="0"/>
-              <a:t>Link para download da ferramenta Controla</a:t>
-            </a:r>
             <a:br>
-              <a:rPr lang="pt-BR" dirty="0"/>
+              <a:rPr lang="en-US" sz="9600" dirty="0">
+                <a:solidFill>
+                  <a:schemeClr val="tx2">
+                    <a:lumMod val="75000"/>
+                  </a:schemeClr>
+                </a:solidFill>
+                <a:latin typeface="Algerian" pitchFamily="82" charset="0"/>
+                <a:cs typeface="Arial" pitchFamily="34" charset="0"/>
+              </a:rPr>
             </a:br>
-            <a:r>
-              <a:rPr lang="pt-BR" u="sng" dirty="0">
-                <a:hlinkClick r:id="rId4"/>
-              </a:rPr>
-              <a:t>http://</a:t>
-            </a:r>
-            <a:r>
-              <a:rPr lang="pt-BR" u="sng" dirty="0" smtClean="0">
-                <a:hlinkClick r:id="rId4"/>
-              </a:rPr>
-              <a:t>www.linkados.com.br</a:t>
-            </a:r>
-            <a:endParaRPr lang="en-US" dirty="0"/>
+            <a:endParaRPr lang="en-US" sz="9600" dirty="0"/>
           </a:p>
         </p:txBody>
       </p:sp>
     </p:spTree>
     <p:extLst>
       <p:ext uri="{BB962C8B-B14F-4D97-AF65-F5344CB8AC3E}">
-        <p14:creationId xmlns:p14="http://schemas.microsoft.com/office/powerpoint/2010/main" val="2800470389"/>
+        <p14:creationId xmlns:p14="http://schemas.microsoft.com/office/powerpoint/2010/main" val="3029949979"/>
       </p:ext>
     </p:extLst>
   </p:cSld>

</xml_diff>